<commit_message>
Added some notes to the slides
</commit_message>
<xml_diff>
--- a/ShiftsHappen/Sprint 2/CSW Sprint 2.pptx
+++ b/ShiftsHappen/Sprint 2/CSW Sprint 2.pptx
@@ -595,6 +595,186 @@
       </p:grpSpPr>
       <p:sp>
         <p:nvSpPr>
+          <p:cNvPr id="2" name="Segnaposto immagine diapositiva 1"/>
+          <p:cNvSpPr>
+            <a:spLocks noGrp="1" noRot="1" noChangeAspect="1"/>
+          </p:cNvSpPr>
+          <p:nvPr>
+            <p:ph type="sldImg"/>
+          </p:nvPr>
+        </p:nvSpPr>
+        <p:spPr/>
+      </p:sp>
+      <p:sp>
+        <p:nvSpPr>
+          <p:cNvPr id="3" name="Segnaposto note 2"/>
+          <p:cNvSpPr>
+            <a:spLocks noGrp="1"/>
+          </p:cNvSpPr>
+          <p:nvPr>
+            <p:ph type="body" idx="1"/>
+          </p:nvPr>
+        </p:nvSpPr>
+        <p:spPr/>
+        <p:txBody>
+          <a:bodyPr/>
+          <a:lstStyle/>
+          <a:p>
+            <a:r>
+              <a:rPr lang="it-IT" dirty="0"/>
+              <a:t>Tra le </a:t>
+            </a:r>
+            <a:r>
+              <a:rPr lang="it-IT" dirty="0" err="1"/>
+              <a:t>issues</a:t>
+            </a:r>
+            <a:r>
+              <a:rPr lang="it-IT" dirty="0"/>
+              <a:t> delineate anche negli scorsi sprint si è osservata la mancanza di test, i quali erano stati disabilitati poiché usavano una nomenclatura e una logica obsoleta, che andava integrata con le modifiche che ci sono state negli anni passati… Un risultato importate da riportare è stato che, una volta integrata la nuova logica e nomenclatura nei vecchi test, questi continuavano a passare, indice di una buona definizione iniziale.</a:t>
+            </a:r>
+            <a:endParaRPr lang="en-GB" dirty="0"/>
+          </a:p>
+        </p:txBody>
+      </p:sp>
+      <p:sp>
+        <p:nvSpPr>
+          <p:cNvPr id="4" name="Segnaposto numero diapositiva 3"/>
+          <p:cNvSpPr>
+            <a:spLocks noGrp="1"/>
+          </p:cNvSpPr>
+          <p:nvPr>
+            <p:ph type="sldNum" sz="quarter" idx="5"/>
+          </p:nvPr>
+        </p:nvSpPr>
+        <p:spPr/>
+        <p:txBody>
+          <a:bodyPr/>
+          <a:lstStyle/>
+          <a:p>
+            <a:fld id="{A2A64AC7-4DA4-48E7-90C1-5D3C29B92E12}" type="slidenum">
+              <a:rPr lang="en-GB" smtClean="0"/>
+              <a:t>4</a:t>
+            </a:fld>
+            <a:endParaRPr lang="en-GB"/>
+          </a:p>
+        </p:txBody>
+      </p:sp>
+    </p:spTree>
+    <p:extLst>
+      <p:ext uri="{BB962C8B-B14F-4D97-AF65-F5344CB8AC3E}">
+        <p14:creationId xmlns:p14="http://schemas.microsoft.com/office/powerpoint/2010/main" val="1685847880"/>
+      </p:ext>
+    </p:extLst>
+  </p:cSld>
+  <p:clrMapOvr>
+    <a:masterClrMapping/>
+  </p:clrMapOvr>
+</p:notes>
+</file>
+
+<file path=ppt/notesSlides/notesSlide3.xml><?xml version="1.0" encoding="utf-8"?>
+<p:notes xmlns:a="http://schemas.openxmlformats.org/drawingml/2006/main" xmlns:r="http://schemas.openxmlformats.org/officeDocument/2006/relationships" xmlns:p="http://schemas.openxmlformats.org/presentationml/2006/main">
+  <p:cSld>
+    <p:spTree>
+      <p:nvGrpSpPr>
+        <p:cNvPr id="1" name=""/>
+        <p:cNvGrpSpPr/>
+        <p:nvPr/>
+      </p:nvGrpSpPr>
+      <p:grpSpPr>
+        <a:xfrm>
+          <a:off x="0" y="0"/>
+          <a:ext cx="0" cy="0"/>
+          <a:chOff x="0" y="0"/>
+          <a:chExt cx="0" cy="0"/>
+        </a:xfrm>
+      </p:grpSpPr>
+      <p:sp>
+        <p:nvSpPr>
+          <p:cNvPr id="2" name="Segnaposto immagine diapositiva 1"/>
+          <p:cNvSpPr>
+            <a:spLocks noGrp="1" noRot="1" noChangeAspect="1"/>
+          </p:cNvSpPr>
+          <p:nvPr>
+            <p:ph type="sldImg"/>
+          </p:nvPr>
+        </p:nvSpPr>
+        <p:spPr/>
+      </p:sp>
+      <p:sp>
+        <p:nvSpPr>
+          <p:cNvPr id="3" name="Segnaposto note 2"/>
+          <p:cNvSpPr>
+            <a:spLocks noGrp="1"/>
+          </p:cNvSpPr>
+          <p:nvPr>
+            <p:ph type="body" idx="1"/>
+          </p:nvPr>
+        </p:nvSpPr>
+        <p:spPr/>
+        <p:txBody>
+          <a:bodyPr/>
+          <a:lstStyle/>
+          <a:p>
+            <a:endParaRPr lang="en-GB" dirty="0"/>
+          </a:p>
+        </p:txBody>
+      </p:sp>
+      <p:sp>
+        <p:nvSpPr>
+          <p:cNvPr id="4" name="Segnaposto numero diapositiva 3"/>
+          <p:cNvSpPr>
+            <a:spLocks noGrp="1"/>
+          </p:cNvSpPr>
+          <p:nvPr>
+            <p:ph type="sldNum" sz="quarter" idx="5"/>
+          </p:nvPr>
+        </p:nvSpPr>
+        <p:spPr/>
+        <p:txBody>
+          <a:bodyPr/>
+          <a:lstStyle/>
+          <a:p>
+            <a:fld id="{A2A64AC7-4DA4-48E7-90C1-5D3C29B92E12}" type="slidenum">
+              <a:rPr lang="en-GB" smtClean="0"/>
+              <a:t>14</a:t>
+            </a:fld>
+            <a:endParaRPr lang="en-GB"/>
+          </a:p>
+        </p:txBody>
+      </p:sp>
+    </p:spTree>
+    <p:extLst>
+      <p:ext uri="{BB962C8B-B14F-4D97-AF65-F5344CB8AC3E}">
+        <p14:creationId xmlns:p14="http://schemas.microsoft.com/office/powerpoint/2010/main" val="1805187566"/>
+      </p:ext>
+    </p:extLst>
+  </p:cSld>
+  <p:clrMapOvr>
+    <a:masterClrMapping/>
+  </p:clrMapOvr>
+</p:notes>
+</file>
+
+<file path=ppt/notesSlides/notesSlide4.xml><?xml version="1.0" encoding="utf-8"?>
+<p:notes xmlns:a="http://schemas.openxmlformats.org/drawingml/2006/main" xmlns:r="http://schemas.openxmlformats.org/officeDocument/2006/relationships" xmlns:p="http://schemas.openxmlformats.org/presentationml/2006/main">
+  <p:cSld>
+    <p:spTree>
+      <p:nvGrpSpPr>
+        <p:cNvPr id="1" name=""/>
+        <p:cNvGrpSpPr/>
+        <p:nvPr/>
+      </p:nvGrpSpPr>
+      <p:grpSpPr>
+        <a:xfrm>
+          <a:off x="0" y="0"/>
+          <a:ext cx="0" cy="0"/>
+          <a:chOff x="0" y="0"/>
+          <a:chExt cx="0" cy="0"/>
+        </a:xfrm>
+      </p:grpSpPr>
+      <p:sp>
+        <p:nvSpPr>
           <p:cNvPr id="2" name="Slide Image Placeholder 1"/>
           <p:cNvSpPr>
             <a:spLocks noGrp="1" noRot="1" noChangeAspect="1"/>
@@ -662,7 +842,7 @@
 </p:notes>
 </file>
 
-<file path=ppt/notesSlides/notesSlide3.xml><?xml version="1.0" encoding="utf-8"?>
+<file path=ppt/notesSlides/notesSlide5.xml><?xml version="1.0" encoding="utf-8"?>
 <p:notes xmlns:a="http://schemas.openxmlformats.org/drawingml/2006/main" xmlns:r="http://schemas.openxmlformats.org/officeDocument/2006/relationships" xmlns:p="http://schemas.openxmlformats.org/presentationml/2006/main">
   <p:cSld>
     <p:spTree>
@@ -766,7 +946,7 @@
 </p:notes>
 </file>
 
-<file path=ppt/notesSlides/notesSlide4.xml><?xml version="1.0" encoding="utf-8"?>
+<file path=ppt/notesSlides/notesSlide6.xml><?xml version="1.0" encoding="utf-8"?>
 <p:notes xmlns:a="http://schemas.openxmlformats.org/drawingml/2006/main" xmlns:r="http://schemas.openxmlformats.org/officeDocument/2006/relationships" xmlns:p="http://schemas.openxmlformats.org/presentationml/2006/main">
   <p:cSld>
     <p:spTree>
@@ -7733,7 +7913,7 @@
           <p:nvPr/>
         </p:nvPicPr>
         <p:blipFill>
-          <a:blip r:embed="rId2"/>
+          <a:blip r:embed="rId3"/>
           <a:stretch>
             <a:fillRect/>
           </a:stretch>
@@ -7760,7 +7940,13 @@
           <p:cNvGraphicFramePr>
             <a:graphicFrameLocks noGrp="1"/>
           </p:cNvGraphicFramePr>
-          <p:nvPr/>
+          <p:nvPr>
+            <p:extLst>
+              <p:ext uri="{D42A27DB-BD31-4B8C-83A1-F6EECF244321}">
+                <p14:modId xmlns:p14="http://schemas.microsoft.com/office/powerpoint/2010/main" val="1900844637"/>
+              </p:ext>
+            </p:extLst>
+          </p:nvPr>
         </p:nvGraphicFramePr>
         <p:xfrm>
           <a:off x="639724" y="2327472"/>
@@ -8555,7 +8741,7 @@
                           <a:ea typeface="+mn-ea"/>
                           <a:cs typeface="+mn-cs"/>
                         </a:rPr>
-                        <a:t> health, dump, environment, dump, e </a:t>
+                        <a:t> health, environment, dump, e </a:t>
                       </a:r>
                       <a:r>
                         <a:rPr lang="en-GB" sz="1100" b="0" i="0" u="none" strike="noStrike" kern="1200" dirty="0" err="1">
@@ -8739,15 +8925,18 @@
                         </a:rPr>
                         <a:t>l’applicazione</a:t>
                       </a:r>
-                      <a:endParaRPr lang="en-GB" sz="1100" b="0" i="0" u="none" strike="noStrike" kern="1200" dirty="0">
-                        <a:solidFill>
-                          <a:schemeClr val="dk1"/>
-                        </a:solidFill>
-                        <a:effectLst/>
-                        <a:latin typeface="+mn-lt"/>
-                        <a:ea typeface="+mn-ea"/>
-                        <a:cs typeface="+mn-cs"/>
-                      </a:endParaRPr>
+                      <a:r>
+                        <a:rPr lang="en-GB" sz="1100" b="0" i="0" u="none" strike="noStrike" kern="1200" dirty="0">
+                          <a:solidFill>
+                            <a:schemeClr val="dk1"/>
+                          </a:solidFill>
+                          <a:effectLst/>
+                          <a:latin typeface="+mn-lt"/>
+                          <a:ea typeface="+mn-ea"/>
+                          <a:cs typeface="+mn-cs"/>
+                        </a:rPr>
+                        <a:t>.</a:t>
+                      </a:r>
                     </a:p>
                     <a:p>
                       <a:endParaRPr lang="en-GB" sz="1100" b="0" i="0" u="none" strike="noStrike" kern="1200" dirty="0">
@@ -8866,7 +9055,7 @@
                           <a:ea typeface="+mn-ea"/>
                           <a:cs typeface="+mn-cs"/>
                         </a:rPr>
-                        <a:t> React: </a:t>
+                        <a:t> React, </a:t>
                       </a:r>
                       <a:r>
                         <a:rPr lang="en-GB" sz="1100" b="0" i="0" u="none" strike="noStrike" kern="1200" dirty="0" err="1">
@@ -10494,7 +10683,7 @@
         <p:spPr>
           <a:xfrm>
             <a:off x="639726" y="1613118"/>
-            <a:ext cx="6654056" cy="3416320"/>
+            <a:ext cx="6654056" cy="3970318"/>
           </a:xfrm>
           <a:prstGeom prst="rect">
             <a:avLst/>
@@ -10542,6 +10731,20 @@
               <a:buFont typeface="Arial" panose="020B0604020202020204" pitchFamily="34" charset="0"/>
               <a:buChar char="•"/>
             </a:pPr>
+            <a:endParaRPr lang="it-IT" dirty="0">
+              <a:solidFill>
+                <a:schemeClr val="tx1">
+                  <a:lumMod val="85000"/>
+                  <a:lumOff val="15000"/>
+                </a:schemeClr>
+              </a:solidFill>
+            </a:endParaRPr>
+          </a:p>
+          <a:p>
+            <a:pPr marL="285750" indent="-285750">
+              <a:buFont typeface="Arial" panose="020B0604020202020204" pitchFamily="34" charset="0"/>
+              <a:buChar char="•"/>
+            </a:pPr>
             <a:r>
               <a:rPr lang="it-IT" noProof="0" dirty="0">
                 <a:solidFill>
@@ -10553,6 +10756,20 @@
               </a:rPr>
               <a:t>Aggiunta la possibilità di creare uno schedulo di un giorno</a:t>
             </a:r>
+          </a:p>
+          <a:p>
+            <a:pPr marL="285750" indent="-285750">
+              <a:buFont typeface="Arial" panose="020B0604020202020204" pitchFamily="34" charset="0"/>
+              <a:buChar char="•"/>
+            </a:pPr>
+            <a:endParaRPr lang="it-IT" dirty="0">
+              <a:solidFill>
+                <a:schemeClr val="tx1">
+                  <a:lumMod val="85000"/>
+                  <a:lumOff val="15000"/>
+                </a:schemeClr>
+              </a:solidFill>
+            </a:endParaRPr>
           </a:p>
           <a:p>
             <a:pPr marL="285750" indent="-285750">
@@ -22256,7 +22473,7 @@
           <p:nvPr/>
         </p:nvPicPr>
         <p:blipFill>
-          <a:blip r:embed="rId2"/>
+          <a:blip r:embed="rId3"/>
           <a:stretch>
             <a:fillRect/>
           </a:stretch>
@@ -22937,7 +23154,13 @@
           <p:cNvGraphicFramePr>
             <a:graphicFrameLocks noGrp="1"/>
           </p:cNvGraphicFramePr>
-          <p:nvPr/>
+          <p:nvPr>
+            <p:extLst>
+              <p:ext uri="{D42A27DB-BD31-4B8C-83A1-F6EECF244321}">
+                <p14:modId xmlns:p14="http://schemas.microsoft.com/office/powerpoint/2010/main" val="3364627457"/>
+              </p:ext>
+            </p:extLst>
+          </p:nvPr>
         </p:nvGraphicFramePr>
         <p:xfrm>
           <a:off x="639724" y="3310909"/>
@@ -22999,7 +23222,31 @@
                           <a:ea typeface="+mn-ea"/>
                           <a:cs typeface="+mn-cs"/>
                         </a:rPr>
-                        <a:t>Pattern: Store the tenant ID in a JWT claim </a:t>
+                        <a:t>Pattern: </a:t>
+                      </a:r>
+                      <a:r>
+                        <a:rPr lang="en-GB" sz="1100" b="0" i="0" u="none" strike="noStrike" kern="1200" dirty="0" err="1">
+                          <a:solidFill>
+                            <a:schemeClr val="dk1"/>
+                          </a:solidFill>
+                          <a:effectLst/>
+                          <a:latin typeface="+mn-lt"/>
+                          <a:ea typeface="+mn-ea"/>
+                          <a:cs typeface="+mn-cs"/>
+                        </a:rPr>
+                        <a:t>salva</a:t>
+                      </a:r>
+                      <a:r>
+                        <a:rPr lang="en-GB" sz="1100" b="0" i="0" u="none" strike="noStrike" kern="1200" dirty="0">
+                          <a:solidFill>
+                            <a:schemeClr val="dk1"/>
+                          </a:solidFill>
+                          <a:effectLst/>
+                          <a:latin typeface="+mn-lt"/>
+                          <a:ea typeface="+mn-ea"/>
+                          <a:cs typeface="+mn-cs"/>
+                        </a:rPr>
+                        <a:t> il tenant ID in un claim JWT</a:t>
                       </a:r>
                     </a:p>
                     <a:p>

</xml_diff>